<commit_message>
Update Bank Marketing Campaign- Predicting Term Deposit Subscriptions.pptx
</commit_message>
<xml_diff>
--- a/document/Bank Marketing Campaign- Predicting Term Deposit Subscriptions.pptx
+++ b/document/Bank Marketing Campaign- Predicting Term Deposit Subscriptions.pptx
@@ -22,10 +22,9 @@
     <p:sldId id="286" r:id="rId16"/>
     <p:sldId id="287" r:id="rId17"/>
     <p:sldId id="289" r:id="rId18"/>
-    <p:sldId id="290" r:id="rId19"/>
-    <p:sldId id="291" r:id="rId20"/>
-    <p:sldId id="288" r:id="rId21"/>
-    <p:sldId id="292" r:id="rId22"/>
+    <p:sldId id="291" r:id="rId19"/>
+    <p:sldId id="288" r:id="rId20"/>
+    <p:sldId id="292" r:id="rId21"/>
   </p:sldIdLst>
   <p:sldSz cx="12192000" cy="6858000"/>
   <p:notesSz cx="6858000" cy="9144000"/>
@@ -279,7 +278,7 @@
           <a:p>
             <a:fld id="{449F7205-82FF-6A40-B097-8037C29C753E}" type="datetimeFigureOut">
               <a:rPr lang="en-US" smtClean="0"/>
-              <a:t>4/10/23</a:t>
+              <a:t>4/14/23</a:t>
             </a:fld>
             <a:endParaRPr lang="en-US"/>
           </a:p>
@@ -477,7 +476,7 @@
           <a:p>
             <a:fld id="{449F7205-82FF-6A40-B097-8037C29C753E}" type="datetimeFigureOut">
               <a:rPr lang="en-US" smtClean="0"/>
-              <a:t>4/10/23</a:t>
+              <a:t>4/14/23</a:t>
             </a:fld>
             <a:endParaRPr lang="en-US"/>
           </a:p>
@@ -685,7 +684,7 @@
           <a:p>
             <a:fld id="{449F7205-82FF-6A40-B097-8037C29C753E}" type="datetimeFigureOut">
               <a:rPr lang="en-US" smtClean="0"/>
-              <a:t>4/10/23</a:t>
+              <a:t>4/14/23</a:t>
             </a:fld>
             <a:endParaRPr lang="en-US"/>
           </a:p>
@@ -883,7 +882,7 @@
           <a:p>
             <a:fld id="{449F7205-82FF-6A40-B097-8037C29C753E}" type="datetimeFigureOut">
               <a:rPr lang="en-US" smtClean="0"/>
-              <a:t>4/10/23</a:t>
+              <a:t>4/14/23</a:t>
             </a:fld>
             <a:endParaRPr lang="en-US"/>
           </a:p>
@@ -1158,7 +1157,7 @@
           <a:p>
             <a:fld id="{449F7205-82FF-6A40-B097-8037C29C753E}" type="datetimeFigureOut">
               <a:rPr lang="en-US" smtClean="0"/>
-              <a:t>4/10/23</a:t>
+              <a:t>4/14/23</a:t>
             </a:fld>
             <a:endParaRPr lang="en-US"/>
           </a:p>
@@ -1423,7 +1422,7 @@
           <a:p>
             <a:fld id="{449F7205-82FF-6A40-B097-8037C29C753E}" type="datetimeFigureOut">
               <a:rPr lang="en-US" smtClean="0"/>
-              <a:t>4/10/23</a:t>
+              <a:t>4/14/23</a:t>
             </a:fld>
             <a:endParaRPr lang="en-US"/>
           </a:p>
@@ -1835,7 +1834,7 @@
           <a:p>
             <a:fld id="{449F7205-82FF-6A40-B097-8037C29C753E}" type="datetimeFigureOut">
               <a:rPr lang="en-US" smtClean="0"/>
-              <a:t>4/10/23</a:t>
+              <a:t>4/14/23</a:t>
             </a:fld>
             <a:endParaRPr lang="en-US"/>
           </a:p>
@@ -1976,7 +1975,7 @@
           <a:p>
             <a:fld id="{449F7205-82FF-6A40-B097-8037C29C753E}" type="datetimeFigureOut">
               <a:rPr lang="en-US" smtClean="0"/>
-              <a:t>4/10/23</a:t>
+              <a:t>4/14/23</a:t>
             </a:fld>
             <a:endParaRPr lang="en-US"/>
           </a:p>
@@ -2089,7 +2088,7 @@
           <a:p>
             <a:fld id="{449F7205-82FF-6A40-B097-8037C29C753E}" type="datetimeFigureOut">
               <a:rPr lang="en-US" smtClean="0"/>
-              <a:t>4/10/23</a:t>
+              <a:t>4/14/23</a:t>
             </a:fld>
             <a:endParaRPr lang="en-US"/>
           </a:p>
@@ -2400,7 +2399,7 @@
           <a:p>
             <a:fld id="{449F7205-82FF-6A40-B097-8037C29C753E}" type="datetimeFigureOut">
               <a:rPr lang="en-US" smtClean="0"/>
-              <a:t>4/10/23</a:t>
+              <a:t>4/14/23</a:t>
             </a:fld>
             <a:endParaRPr lang="en-US"/>
           </a:p>
@@ -2688,7 +2687,7 @@
           <a:p>
             <a:fld id="{449F7205-82FF-6A40-B097-8037C29C753E}" type="datetimeFigureOut">
               <a:rPr lang="en-US" smtClean="0"/>
-              <a:t>4/10/23</a:t>
+              <a:t>4/14/23</a:t>
             </a:fld>
             <a:endParaRPr lang="en-US"/>
           </a:p>
@@ -2929,7 +2928,7 @@
           <a:p>
             <a:fld id="{449F7205-82FF-6A40-B097-8037C29C753E}" type="datetimeFigureOut">
               <a:rPr lang="en-US" smtClean="0"/>
-              <a:t>4/10/23</a:t>
+              <a:t>4/14/23</a:t>
             </a:fld>
             <a:endParaRPr lang="en-US"/>
           </a:p>
@@ -8791,7 +8790,7 @@
         <p:spPr>
           <a:xfrm>
             <a:off x="1081434" y="1030794"/>
-            <a:ext cx="8735805" cy="633180"/>
+            <a:ext cx="8062565" cy="633180"/>
           </a:xfrm>
           <a:prstGeom prst="rect">
             <a:avLst/>
@@ -8827,7 +8826,46 @@
                 <a:effectLst/>
                 <a:latin typeface="-apple-system"/>
               </a:rPr>
-              <a:t>Account Balance For Marketing </a:t>
+              <a:t>Age </a:t>
+            </a:r>
+            <a:r>
+              <a:rPr lang="en-US" sz="2800" b="1" dirty="0">
+                <a:latin typeface="-apple-system"/>
+              </a:rPr>
+              <a:t>B</a:t>
+            </a:r>
+            <a:r>
+              <a:rPr lang="en-US" sz="2800" b="1" i="0" dirty="0">
+                <a:effectLst/>
+                <a:latin typeface="-apple-system"/>
+              </a:rPr>
+              <a:t>ucket </a:t>
+            </a:r>
+            <a:r>
+              <a:rPr lang="en-US" sz="2800" b="1" dirty="0">
+                <a:latin typeface="-apple-system"/>
+              </a:rPr>
+              <a:t>F</a:t>
+            </a:r>
+            <a:r>
+              <a:rPr lang="en-US" sz="2800" b="1" i="0" dirty="0">
+                <a:effectLst/>
+                <a:latin typeface="-apple-system"/>
+              </a:rPr>
+              <a:t>or </a:t>
+            </a:r>
+            <a:r>
+              <a:rPr lang="en-US" sz="2800" b="1" dirty="0">
+                <a:latin typeface="-apple-system"/>
+              </a:rPr>
+              <a:t>M</a:t>
+            </a:r>
+            <a:r>
+              <a:rPr lang="en-US" sz="2800" b="1" i="0" dirty="0">
+                <a:effectLst/>
+                <a:latin typeface="-apple-system"/>
+              </a:rPr>
+              <a:t>arketing </a:t>
             </a:r>
             <a:r>
               <a:rPr lang="en-US" sz="2800" b="1" dirty="0">
@@ -8861,8 +8899,8 @@
         </p:nvSpPr>
         <p:spPr>
           <a:xfrm>
-            <a:off x="1231470" y="3877496"/>
-            <a:ext cx="4435111" cy="1991383"/>
+            <a:off x="1081434" y="5358330"/>
+            <a:ext cx="9155642" cy="614977"/>
           </a:xfrm>
           <a:prstGeom prst="rect">
             <a:avLst/>
@@ -9037,12 +9075,10 @@
             </a:lvl9pPr>
           </a:lstStyle>
           <a:p>
-            <a:pPr marL="0" indent="0">
+            <a:pPr>
               <a:spcBef>
                 <a:spcPts val="0"/>
               </a:spcBef>
-              <a:buFont typeface="Arial" panose="020B0604020202020204" pitchFamily="34" charset="0"/>
-              <a:buNone/>
             </a:pPr>
             <a:r>
               <a:rPr lang="en-US" sz="1500" dirty="0">
@@ -9055,18 +9091,40 @@
                 <a:effectLst/>
                 <a:latin typeface="-apple-system"/>
               </a:rPr>
-              <a:t>arketing campaigns should concentrate on customers with account balance greater than $1490.</a:t>
-            </a:r>
-            <a:endParaRPr lang="en-US" sz="1500" dirty="0"/>
+              <a:t>arketing campaigns should concentrate on customers with account balance greater than $1490</a:t>
+            </a:r>
+            <a:endParaRPr lang="en-US" sz="1500" dirty="0">
+              <a:latin typeface="-apple-system"/>
+            </a:endParaRPr>
+          </a:p>
+          <a:p>
+            <a:pPr>
+              <a:spcBef>
+                <a:spcPts val="0"/>
+              </a:spcBef>
+            </a:pPr>
+            <a:r>
+              <a:rPr lang="en-US" sz="1500" dirty="0">
+                <a:latin typeface="-apple-system"/>
+              </a:rPr>
+              <a:t>M</a:t>
+            </a:r>
+            <a:r>
+              <a:rPr lang="en-US" sz="1500" b="0" i="0" dirty="0">
+                <a:effectLst/>
+                <a:latin typeface="-apple-system"/>
+              </a:rPr>
+              <a:t>arketing campaigns should concentrate on customers with age below 31 years old or above 56 years old</a:t>
+            </a:r>
           </a:p>
         </p:txBody>
       </p:sp>
       <p:pic>
         <p:nvPicPr>
-          <p:cNvPr id="8" name="Picture 7" descr="Chart, line chart&#10;&#10;Description automatically generated">
-            <a:extLst>
-              <a:ext uri="{FF2B5EF4-FFF2-40B4-BE49-F238E27FC236}">
-                <a16:creationId xmlns:a16="http://schemas.microsoft.com/office/drawing/2014/main" id="{4744B824-4618-DA87-1A95-CA17470F8464}"/>
+          <p:cNvPr id="3" name="Picture 2" descr="Chart, line chart&#10;&#10;Description automatically generated">
+            <a:extLst>
+              <a:ext uri="{FF2B5EF4-FFF2-40B4-BE49-F238E27FC236}">
+                <a16:creationId xmlns:a16="http://schemas.microsoft.com/office/drawing/2014/main" id="{42F4FC0A-BA91-96A7-6380-6F7AB68F2CBF}"/>
               </a:ext>
             </a:extLst>
           </p:cNvPr>
@@ -9083,8 +9141,8 @@
         </p:blipFill>
         <p:spPr>
           <a:xfrm>
-            <a:off x="6096000" y="2020197"/>
-            <a:ext cx="5205484" cy="3667169"/>
+            <a:off x="5954623" y="1910315"/>
+            <a:ext cx="4628060" cy="3322710"/>
           </a:xfrm>
           <a:prstGeom prst="rect">
             <a:avLst/>
@@ -9093,10 +9151,10 @@
       </p:pic>
       <p:pic>
         <p:nvPicPr>
-          <p:cNvPr id="10" name="Picture 9" descr="Graphical user interface, application, Word&#10;&#10;Description automatically generated">
-            <a:extLst>
-              <a:ext uri="{FF2B5EF4-FFF2-40B4-BE49-F238E27FC236}">
-                <a16:creationId xmlns:a16="http://schemas.microsoft.com/office/drawing/2014/main" id="{5387E052-5291-5BAA-F51E-685650DC1FB5}"/>
+          <p:cNvPr id="5" name="Picture 4" descr="Chart, line chart&#10;&#10;Description automatically generated">
+            <a:extLst>
+              <a:ext uri="{FF2B5EF4-FFF2-40B4-BE49-F238E27FC236}">
+                <a16:creationId xmlns:a16="http://schemas.microsoft.com/office/drawing/2014/main" id="{891721D4-87B9-209A-F56C-6FD18BD175E7}"/>
               </a:ext>
             </a:extLst>
           </p:cNvPr>
@@ -9113,8 +9171,8 @@
         </p:blipFill>
         <p:spPr>
           <a:xfrm>
-            <a:off x="1231470" y="2393148"/>
-            <a:ext cx="4381912" cy="901628"/>
+            <a:off x="1258535" y="1912941"/>
+            <a:ext cx="4712801" cy="3320083"/>
           </a:xfrm>
           <a:prstGeom prst="rect">
             <a:avLst/>
@@ -9124,7 +9182,7 @@
     </p:spTree>
     <p:extLst>
       <p:ext uri="{BB962C8B-B14F-4D97-AF65-F5344CB8AC3E}">
-        <p14:creationId xmlns:p14="http://schemas.microsoft.com/office/powerpoint/2010/main" val="2221526262"/>
+        <p14:creationId xmlns:p14="http://schemas.microsoft.com/office/powerpoint/2010/main" val="1513159100"/>
       </p:ext>
     </p:extLst>
   </p:cSld>
@@ -9486,8 +9544,8 @@
         </p:nvSpPr>
         <p:spPr>
           <a:xfrm>
-            <a:off x="1081434" y="1030794"/>
-            <a:ext cx="8062565" cy="633180"/>
+            <a:off x="1191966" y="900622"/>
+            <a:ext cx="9429142" cy="857840"/>
           </a:xfrm>
           <a:prstGeom prst="rect">
             <a:avLst/>
@@ -9495,7 +9553,7 @@
         </p:spPr>
         <p:txBody>
           <a:bodyPr vert="horz" lIns="91440" tIns="45720" rIns="91440" bIns="45720" rtlCol="0" anchor="b">
-            <a:noAutofit/>
+            <a:normAutofit/>
           </a:bodyPr>
           <a:lstStyle>
             <a:lvl1pPr algn="l" defTabSz="914400" rtl="0" eaLnBrk="1" latinLnBrk="0" hangingPunct="1">
@@ -9517,349 +9575,207 @@
             </a:lvl1pPr>
           </a:lstStyle>
           <a:p>
-            <a:pPr algn="l"/>
+            <a:pPr>
+              <a:spcAft>
+                <a:spcPts val="600"/>
+              </a:spcAft>
+            </a:pPr>
             <a:r>
               <a:rPr lang="en-US" sz="2800" b="1" i="0" dirty="0">
+                <a:solidFill>
+                  <a:srgbClr val="1F2328"/>
+                </a:solidFill>
+                <a:effectLst/>
+                <a:latin typeface="+mn-lt"/>
+              </a:rPr>
+              <a:t>Recommendations: </a:t>
+            </a:r>
+            <a:r>
+              <a:rPr lang="en-US" sz="2800" b="1" i="0" dirty="0">
+                <a:solidFill>
+                  <a:srgbClr val="1F2328"/>
+                </a:solidFill>
                 <a:effectLst/>
                 <a:latin typeface="-apple-system"/>
               </a:rPr>
-              <a:t>Age </a:t>
-            </a:r>
-            <a:r>
-              <a:rPr lang="en-US" sz="2800" b="1" dirty="0">
-                <a:latin typeface="-apple-system"/>
-              </a:rPr>
-              <a:t>B</a:t>
-            </a:r>
-            <a:r>
-              <a:rPr lang="en-US" sz="2800" b="1" i="0" dirty="0">
+              <a:t>What Actions should the Bank Consider? </a:t>
+            </a:r>
+            <a:endParaRPr lang="en-US" sz="2800" b="1" i="0" dirty="0">
+              <a:effectLst/>
+              <a:latin typeface="+mn-lt"/>
+            </a:endParaRPr>
+          </a:p>
+        </p:txBody>
+      </p:sp>
+      <p:sp>
+        <p:nvSpPr>
+          <p:cNvPr id="3" name="Content Placeholder 2">
+            <a:extLst>
+              <a:ext uri="{FF2B5EF4-FFF2-40B4-BE49-F238E27FC236}">
+                <a16:creationId xmlns:a16="http://schemas.microsoft.com/office/drawing/2014/main" id="{7B8F423F-870B-E576-FF3E-DD2BC827E59E}"/>
+              </a:ext>
+            </a:extLst>
+          </p:cNvPr>
+          <p:cNvSpPr>
+            <a:spLocks noGrp="1"/>
+          </p:cNvSpPr>
+          <p:nvPr>
+            <p:ph idx="1"/>
+          </p:nvPr>
+        </p:nvSpPr>
+        <p:spPr>
+          <a:xfrm>
+            <a:off x="1191966" y="2029768"/>
+            <a:ext cx="9328658" cy="3877370"/>
+          </a:xfrm>
+        </p:spPr>
+        <p:txBody>
+          <a:bodyPr vert="horz" lIns="91440" tIns="45720" rIns="91440" bIns="45720" rtlCol="0">
+            <a:noAutofit/>
+          </a:bodyPr>
+          <a:lstStyle/>
+          <a:p>
+            <a:pPr marL="0" indent="0" algn="l">
+              <a:buNone/>
+            </a:pPr>
+            <a:r>
+              <a:rPr lang="en-US" sz="1500" b="1" i="0" dirty="0">
+                <a:solidFill>
+                  <a:srgbClr val="1F2328"/>
+                </a:solidFill>
                 <a:effectLst/>
                 <a:latin typeface="-apple-system"/>
               </a:rPr>
-              <a:t>ucket </a:t>
-            </a:r>
-            <a:r>
-              <a:rPr lang="en-US" sz="2800" b="1" dirty="0">
-                <a:latin typeface="-apple-system"/>
-              </a:rPr>
-              <a:t>F</a:t>
-            </a:r>
-            <a:r>
-              <a:rPr lang="en-US" sz="2800" b="1" i="0" dirty="0">
+              <a:t>Solutions for the Next Marketing Campaign (Conclusion):</a:t>
+            </a:r>
+            <a:endParaRPr lang="en-US" sz="1500" dirty="0">
+              <a:solidFill>
+                <a:srgbClr val="1F2328"/>
+              </a:solidFill>
+              <a:latin typeface="-apple-system"/>
+            </a:endParaRPr>
+          </a:p>
+          <a:p>
+            <a:pPr algn="l">
+              <a:buFont typeface="+mj-lt"/>
+              <a:buAutoNum type="arabicPeriod"/>
+            </a:pPr>
+            <a:r>
+              <a:rPr lang="en-US" sz="1500" b="1" i="0" dirty="0">
+                <a:solidFill>
+                  <a:srgbClr val="1F2328"/>
+                </a:solidFill>
                 <a:effectLst/>
                 <a:latin typeface="-apple-system"/>
               </a:rPr>
-              <a:t>or </a:t>
-            </a:r>
-            <a:r>
-              <a:rPr lang="en-US" sz="2800" b="1" dirty="0">
-                <a:latin typeface="-apple-system"/>
-              </a:rPr>
-              <a:t>M</a:t>
-            </a:r>
-            <a:r>
-              <a:rPr lang="en-US" sz="2800" b="1" i="0" dirty="0">
+              <a:t>Age Category:</a:t>
+            </a:r>
+            <a:r>
+              <a:rPr lang="en-US" sz="1500" b="0" i="0" dirty="0">
+                <a:solidFill>
+                  <a:srgbClr val="1F2328"/>
+                </a:solidFill>
                 <a:effectLst/>
                 <a:latin typeface="-apple-system"/>
               </a:rPr>
-              <a:t>arketing </a:t>
-            </a:r>
-            <a:r>
-              <a:rPr lang="en-US" sz="2800" b="1" dirty="0">
-                <a:latin typeface="-apple-system"/>
-              </a:rPr>
-              <a:t>C</a:t>
-            </a:r>
-            <a:r>
-              <a:rPr lang="en-US" sz="2800" b="1" i="0" dirty="0">
+              <a:t> The next marketing campaign of the bank should target potential clients from age categories below 30 years old and above 50 years old.</a:t>
+            </a:r>
+          </a:p>
+          <a:p>
+            <a:pPr algn="l">
+              <a:buFont typeface="+mj-lt"/>
+              <a:buAutoNum type="arabicPeriod"/>
+            </a:pPr>
+            <a:r>
+              <a:rPr lang="en-US" sz="1500" b="1" i="0" dirty="0">
+                <a:solidFill>
+                  <a:srgbClr val="1F2328"/>
+                </a:solidFill>
                 <a:effectLst/>
                 <a:latin typeface="-apple-system"/>
               </a:rPr>
-              <a:t>ampaign</a:t>
-            </a:r>
-          </a:p>
-        </p:txBody>
-      </p:sp>
-      <p:sp>
-        <p:nvSpPr>
-          <p:cNvPr id="6" name="Content Placeholder 2">
-            <a:extLst>
-              <a:ext uri="{FF2B5EF4-FFF2-40B4-BE49-F238E27FC236}">
-                <a16:creationId xmlns:a16="http://schemas.microsoft.com/office/drawing/2014/main" id="{7523C877-B006-8DC0-6C6E-C59535E0A258}"/>
-              </a:ext>
-            </a:extLst>
-          </p:cNvPr>
-          <p:cNvSpPr txBox="1">
-            <a:spLocks/>
-          </p:cNvSpPr>
-          <p:nvPr/>
-        </p:nvSpPr>
-        <p:spPr>
-          <a:xfrm>
-            <a:off x="1075922" y="4052635"/>
-            <a:ext cx="4421433" cy="1774571"/>
-          </a:xfrm>
-          <a:prstGeom prst="rect">
-            <a:avLst/>
-          </a:prstGeom>
-        </p:spPr>
-        <p:txBody>
-          <a:bodyPr vert="horz" lIns="91440" tIns="45720" rIns="91440" bIns="45720" rtlCol="0">
-            <a:noAutofit/>
-          </a:bodyPr>
-          <a:lstStyle>
-            <a:lvl1pPr marL="228600" indent="-228600" algn="l" defTabSz="914400" rtl="0" eaLnBrk="1" latinLnBrk="0" hangingPunct="1">
-              <a:lnSpc>
-                <a:spcPct val="90000"/>
-              </a:lnSpc>
-              <a:spcBef>
-                <a:spcPts val="1000"/>
-              </a:spcBef>
-              <a:buFont typeface="Arial" panose="020B0604020202020204" pitchFamily="34" charset="0"/>
-              <a:buChar char="•"/>
-              <a:defRPr sz="2800" kern="1200">
+              <a:t>Occupation:</a:t>
+            </a:r>
+            <a:r>
+              <a:rPr lang="en-US" sz="1500" b="0" i="0" dirty="0">
                 <a:solidFill>
-                  <a:schemeClr val="tx1"/>
+                  <a:srgbClr val="1F2328"/>
                 </a:solidFill>
-                <a:latin typeface="+mn-lt"/>
-                <a:ea typeface="+mn-ea"/>
-                <a:cs typeface="+mn-cs"/>
-              </a:defRPr>
-            </a:lvl1pPr>
-            <a:lvl2pPr marL="685800" indent="-228600" algn="l" defTabSz="914400" rtl="0" eaLnBrk="1" latinLnBrk="0" hangingPunct="1">
-              <a:lnSpc>
-                <a:spcPct val="90000"/>
-              </a:lnSpc>
-              <a:spcBef>
-                <a:spcPts val="500"/>
-              </a:spcBef>
-              <a:buFont typeface="Arial" panose="020B0604020202020204" pitchFamily="34" charset="0"/>
-              <a:buChar char="•"/>
-              <a:defRPr sz="2400" kern="1200">
-                <a:solidFill>
-                  <a:schemeClr val="tx1"/>
-                </a:solidFill>
-                <a:latin typeface="+mn-lt"/>
-                <a:ea typeface="+mn-ea"/>
-                <a:cs typeface="+mn-cs"/>
-              </a:defRPr>
-            </a:lvl2pPr>
-            <a:lvl3pPr marL="1143000" indent="-228600" algn="l" defTabSz="914400" rtl="0" eaLnBrk="1" latinLnBrk="0" hangingPunct="1">
-              <a:lnSpc>
-                <a:spcPct val="90000"/>
-              </a:lnSpc>
-              <a:spcBef>
-                <a:spcPts val="500"/>
-              </a:spcBef>
-              <a:buFont typeface="Arial" panose="020B0604020202020204" pitchFamily="34" charset="0"/>
-              <a:buChar char="•"/>
-              <a:defRPr sz="2000" kern="1200">
-                <a:solidFill>
-                  <a:schemeClr val="tx1"/>
-                </a:solidFill>
-                <a:latin typeface="+mn-lt"/>
-                <a:ea typeface="+mn-ea"/>
-                <a:cs typeface="+mn-cs"/>
-              </a:defRPr>
-            </a:lvl3pPr>
-            <a:lvl4pPr marL="1600200" indent="-228600" algn="l" defTabSz="914400" rtl="0" eaLnBrk="1" latinLnBrk="0" hangingPunct="1">
-              <a:lnSpc>
-                <a:spcPct val="90000"/>
-              </a:lnSpc>
-              <a:spcBef>
-                <a:spcPts val="500"/>
-              </a:spcBef>
-              <a:buFont typeface="Arial" panose="020B0604020202020204" pitchFamily="34" charset="0"/>
-              <a:buChar char="•"/>
-              <a:defRPr sz="1800" kern="1200">
-                <a:solidFill>
-                  <a:schemeClr val="tx1"/>
-                </a:solidFill>
-                <a:latin typeface="+mn-lt"/>
-                <a:ea typeface="+mn-ea"/>
-                <a:cs typeface="+mn-cs"/>
-              </a:defRPr>
-            </a:lvl4pPr>
-            <a:lvl5pPr marL="2057400" indent="-228600" algn="l" defTabSz="914400" rtl="0" eaLnBrk="1" latinLnBrk="0" hangingPunct="1">
-              <a:lnSpc>
-                <a:spcPct val="90000"/>
-              </a:lnSpc>
-              <a:spcBef>
-                <a:spcPts val="500"/>
-              </a:spcBef>
-              <a:buFont typeface="Arial" panose="020B0604020202020204" pitchFamily="34" charset="0"/>
-              <a:buChar char="•"/>
-              <a:defRPr sz="1800" kern="1200">
-                <a:solidFill>
-                  <a:schemeClr val="tx1"/>
-                </a:solidFill>
-                <a:latin typeface="+mn-lt"/>
-                <a:ea typeface="+mn-ea"/>
-                <a:cs typeface="+mn-cs"/>
-              </a:defRPr>
-            </a:lvl5pPr>
-            <a:lvl6pPr marL="2514600" indent="-228600" algn="l" defTabSz="914400" rtl="0" eaLnBrk="1" latinLnBrk="0" hangingPunct="1">
-              <a:lnSpc>
-                <a:spcPct val="90000"/>
-              </a:lnSpc>
-              <a:spcBef>
-                <a:spcPts val="500"/>
-              </a:spcBef>
-              <a:buFont typeface="Arial" panose="020B0604020202020204" pitchFamily="34" charset="0"/>
-              <a:buChar char="•"/>
-              <a:defRPr sz="1800" kern="1200">
-                <a:solidFill>
-                  <a:schemeClr val="tx1"/>
-                </a:solidFill>
-                <a:latin typeface="+mn-lt"/>
-                <a:ea typeface="+mn-ea"/>
-                <a:cs typeface="+mn-cs"/>
-              </a:defRPr>
-            </a:lvl6pPr>
-            <a:lvl7pPr marL="2971800" indent="-228600" algn="l" defTabSz="914400" rtl="0" eaLnBrk="1" latinLnBrk="0" hangingPunct="1">
-              <a:lnSpc>
-                <a:spcPct val="90000"/>
-              </a:lnSpc>
-              <a:spcBef>
-                <a:spcPts val="500"/>
-              </a:spcBef>
-              <a:buFont typeface="Arial" panose="020B0604020202020204" pitchFamily="34" charset="0"/>
-              <a:buChar char="•"/>
-              <a:defRPr sz="1800" kern="1200">
-                <a:solidFill>
-                  <a:schemeClr val="tx1"/>
-                </a:solidFill>
-                <a:latin typeface="+mn-lt"/>
-                <a:ea typeface="+mn-ea"/>
-                <a:cs typeface="+mn-cs"/>
-              </a:defRPr>
-            </a:lvl7pPr>
-            <a:lvl8pPr marL="3429000" indent="-228600" algn="l" defTabSz="914400" rtl="0" eaLnBrk="1" latinLnBrk="0" hangingPunct="1">
-              <a:lnSpc>
-                <a:spcPct val="90000"/>
-              </a:lnSpc>
-              <a:spcBef>
-                <a:spcPts val="500"/>
-              </a:spcBef>
-              <a:buFont typeface="Arial" panose="020B0604020202020204" pitchFamily="34" charset="0"/>
-              <a:buChar char="•"/>
-              <a:defRPr sz="1800" kern="1200">
-                <a:solidFill>
-                  <a:schemeClr val="tx1"/>
-                </a:solidFill>
-                <a:latin typeface="+mn-lt"/>
-                <a:ea typeface="+mn-ea"/>
-                <a:cs typeface="+mn-cs"/>
-              </a:defRPr>
-            </a:lvl8pPr>
-            <a:lvl9pPr marL="3886200" indent="-228600" algn="l" defTabSz="914400" rtl="0" eaLnBrk="1" latinLnBrk="0" hangingPunct="1">
-              <a:lnSpc>
-                <a:spcPct val="90000"/>
-              </a:lnSpc>
-              <a:spcBef>
-                <a:spcPts val="500"/>
-              </a:spcBef>
-              <a:buFont typeface="Arial" panose="020B0604020202020204" pitchFamily="34" charset="0"/>
-              <a:buChar char="•"/>
-              <a:defRPr sz="1800" kern="1200">
-                <a:solidFill>
-                  <a:schemeClr val="tx1"/>
-                </a:solidFill>
-                <a:latin typeface="+mn-lt"/>
-                <a:ea typeface="+mn-ea"/>
-                <a:cs typeface="+mn-cs"/>
-              </a:defRPr>
-            </a:lvl9pPr>
-          </a:lstStyle>
-          <a:p>
-            <a:pPr marL="0" indent="0">
-              <a:spcBef>
-                <a:spcPts val="0"/>
-              </a:spcBef>
-              <a:buFont typeface="Arial" panose="020B0604020202020204" pitchFamily="34" charset="0"/>
-              <a:buNone/>
-            </a:pPr>
-            <a:r>
-              <a:rPr lang="en-US" sz="1500" dirty="0">
-                <a:latin typeface="-apple-system"/>
-              </a:rPr>
-              <a:t>M</a:t>
-            </a:r>
-            <a:r>
-              <a:rPr lang="en-US" sz="1500" b="0" i="0" dirty="0">
                 <a:effectLst/>
                 <a:latin typeface="-apple-system"/>
               </a:rPr>
-              <a:t>arketing campaigns should concentrate on customers with age below 31 years old or above 56 years old.</a:t>
-            </a:r>
-            <a:endParaRPr lang="en-US" sz="1500" dirty="0"/>
-          </a:p>
-        </p:txBody>
-      </p:sp>
-      <p:pic>
-        <p:nvPicPr>
-          <p:cNvPr id="3" name="Picture 2" descr="Chart, line chart&#10;&#10;Description automatically generated">
-            <a:extLst>
-              <a:ext uri="{FF2B5EF4-FFF2-40B4-BE49-F238E27FC236}">
-                <a16:creationId xmlns:a16="http://schemas.microsoft.com/office/drawing/2014/main" id="{42F4FC0A-BA91-96A7-6380-6F7AB68F2CBF}"/>
-              </a:ext>
-            </a:extLst>
-          </p:cNvPr>
-          <p:cNvPicPr>
-            <a:picLocks noChangeAspect="1"/>
-          </p:cNvPicPr>
-          <p:nvPr/>
-        </p:nvPicPr>
-        <p:blipFill>
-          <a:blip r:embed="rId3"/>
-          <a:stretch>
-            <a:fillRect/>
-          </a:stretch>
-        </p:blipFill>
-        <p:spPr>
-          <a:xfrm>
-            <a:off x="6048413" y="1838848"/>
-            <a:ext cx="5207648" cy="3738824"/>
-          </a:xfrm>
-          <a:prstGeom prst="rect">
-            <a:avLst/>
-          </a:prstGeom>
-        </p:spPr>
-      </p:pic>
-      <p:pic>
-        <p:nvPicPr>
-          <p:cNvPr id="7" name="Picture 6" descr="Graphical user interface, text, application&#10;&#10;Description automatically generated">
-            <a:extLst>
-              <a:ext uri="{FF2B5EF4-FFF2-40B4-BE49-F238E27FC236}">
-                <a16:creationId xmlns:a16="http://schemas.microsoft.com/office/drawing/2014/main" id="{0EA6B5D6-EB7A-0675-0FCB-A9ABDC420753}"/>
-              </a:ext>
-            </a:extLst>
-          </p:cNvPr>
-          <p:cNvPicPr>
-            <a:picLocks noChangeAspect="1"/>
-          </p:cNvPicPr>
-          <p:nvPr/>
-        </p:nvPicPr>
-        <p:blipFill>
-          <a:blip r:embed="rId4"/>
-          <a:stretch>
-            <a:fillRect/>
-          </a:stretch>
-        </p:blipFill>
-        <p:spPr>
-          <a:xfrm>
-            <a:off x="1081434" y="2024372"/>
-            <a:ext cx="4244192" cy="1845754"/>
-          </a:xfrm>
-          <a:prstGeom prst="rect">
-            <a:avLst/>
-          </a:prstGeom>
-        </p:spPr>
-      </p:pic>
+              <a:t> Not surprisingly, potential clients that were students or retired were the most likely to subscribe to a term deposit. Retired individuals, tend to have more term deposits in order to gain some cash through interest payments. Remember, term deposits are short-term loans in which the individual (in this case the retired person) agrees not to withdraw the cash from the bank until a certain date agreed between the individual and the financial institution. After that time the individual gets its capital back and its interest made on the loan. Retired individuals tend to not spend bigly its cash so they are more likely to put their cash to work by lending it to the financial institution. Students were the other group that used to subscribe term deposits.</a:t>
+            </a:r>
+          </a:p>
+          <a:p>
+            <a:pPr algn="l">
+              <a:buFont typeface="+mj-lt"/>
+              <a:buAutoNum type="arabicPeriod"/>
+            </a:pPr>
+            <a:r>
+              <a:rPr lang="en-US" sz="1500" b="1" i="0" dirty="0">
+                <a:solidFill>
+                  <a:srgbClr val="1F2328"/>
+                </a:solidFill>
+                <a:effectLst/>
+                <a:latin typeface="-apple-system"/>
+              </a:rPr>
+              <a:t>Balance:</a:t>
+            </a:r>
+            <a:r>
+              <a:rPr lang="en-US" sz="1500" b="0" i="0" dirty="0">
+                <a:solidFill>
+                  <a:srgbClr val="1F2328"/>
+                </a:solidFill>
+                <a:effectLst/>
+                <a:latin typeface="-apple-system"/>
+              </a:rPr>
+              <a:t> The customer's account balance has a huge influence on the campaign's outcome. People with account balance above 1490$ are more likely to subscribe for term deposit, so future address those customers.</a:t>
+            </a:r>
+          </a:p>
+          <a:p>
+            <a:pPr algn="l">
+              <a:buFont typeface="+mj-lt"/>
+              <a:buAutoNum type="arabicPeriod"/>
+            </a:pPr>
+            <a:r>
+              <a:rPr lang="en-US" sz="1500" b="1" i="0" dirty="0">
+                <a:solidFill>
+                  <a:srgbClr val="1F2328"/>
+                </a:solidFill>
+                <a:effectLst/>
+                <a:latin typeface="-apple-system"/>
+              </a:rPr>
+              <a:t>Seasonality:</a:t>
+            </a:r>
+            <a:r>
+              <a:rPr lang="en-US" sz="1500" b="0" i="0" dirty="0">
+                <a:solidFill>
+                  <a:srgbClr val="1F2328"/>
+                </a:solidFill>
+                <a:effectLst/>
+                <a:latin typeface="-apple-system"/>
+              </a:rPr>
+              <a:t> Potential clients opted to subscribe term deposits during the seasons of fall and winter. The next marketing campaign should focus its activity throughout these seasons.</a:t>
+            </a:r>
+          </a:p>
+          <a:p>
+            <a:pPr algn="l">
+              <a:buFont typeface="+mj-lt"/>
+              <a:buAutoNum type="arabicPeriod"/>
+            </a:pPr>
+            <a:endParaRPr lang="en-US" sz="1500" dirty="0">
+              <a:solidFill>
+                <a:srgbClr val="1F2328"/>
+              </a:solidFill>
+            </a:endParaRPr>
+          </a:p>
+        </p:txBody>
+      </p:sp>
     </p:spTree>
     <p:extLst>
       <p:ext uri="{BB962C8B-B14F-4D97-AF65-F5344CB8AC3E}">
-        <p14:creationId xmlns:p14="http://schemas.microsoft.com/office/powerpoint/2010/main" val="1513159100"/>
+        <p14:creationId xmlns:p14="http://schemas.microsoft.com/office/powerpoint/2010/main" val="3225170695"/>
       </p:ext>
     </p:extLst>
   </p:cSld>
@@ -10284,599 +10200,6 @@
 </file>
 
 <file path=ppt/slides/slide20.xml><?xml version="1.0" encoding="utf-8"?>
-<p:sld xmlns:a="http://schemas.openxmlformats.org/drawingml/2006/main" xmlns:r="http://schemas.openxmlformats.org/officeDocument/2006/relationships" xmlns:p="http://schemas.openxmlformats.org/presentationml/2006/main">
-  <p:cSld>
-    <p:bg>
-      <p:bgPr>
-        <a:solidFill>
-          <a:schemeClr val="bg1"/>
-        </a:solidFill>
-        <a:effectLst/>
-      </p:bgPr>
-    </p:bg>
-    <p:spTree>
-      <p:nvGrpSpPr>
-        <p:cNvPr id="1" name=""/>
-        <p:cNvGrpSpPr/>
-        <p:nvPr/>
-      </p:nvGrpSpPr>
-      <p:grpSpPr>
-        <a:xfrm>
-          <a:off x="0" y="0"/>
-          <a:ext cx="0" cy="0"/>
-          <a:chOff x="0" y="0"/>
-          <a:chExt cx="0" cy="0"/>
-        </a:xfrm>
-      </p:grpSpPr>
-      <p:sp useBgFill="1">
-        <p:nvSpPr>
-          <p:cNvPr id="35" name="Rectangle 34">
-            <a:extLst>
-              <a:ext uri="{FF2B5EF4-FFF2-40B4-BE49-F238E27FC236}">
-                <a16:creationId xmlns:a16="http://schemas.microsoft.com/office/drawing/2014/main" id="{0D7B6173-1D58-48E2-83CF-37350F315F75}"/>
-              </a:ext>
-              <a:ext uri="{C183D7F6-B498-43B3-948B-1728B52AA6E4}">
-                <adec:decorative xmlns:adec="http://schemas.microsoft.com/office/drawing/2017/decorative" val="1"/>
-              </a:ext>
-            </a:extLst>
-          </p:cNvPr>
-          <p:cNvSpPr>
-            <a:spLocks noGrp="1" noRot="1" noChangeAspect="1" noMove="1" noResize="1" noEditPoints="1" noAdjustHandles="1" noChangeArrowheads="1" noChangeShapeType="1" noTextEdit="1"/>
-          </p:cNvSpPr>
-          <p:nvPr>
-            <p:extLst>
-              <p:ext uri="{386F3935-93C4-4BCD-93E2-E3B085C9AB24}">
-                <p16:designElem xmlns:p16="http://schemas.microsoft.com/office/powerpoint/2015/main" val="1"/>
-              </p:ext>
-            </p:extLst>
-          </p:nvPr>
-        </p:nvSpPr>
-        <p:spPr>
-          <a:xfrm>
-            <a:off x="0" y="-1"/>
-            <a:ext cx="12188952" cy="6858000"/>
-          </a:xfrm>
-          <a:prstGeom prst="rect">
-            <a:avLst/>
-          </a:prstGeom>
-          <a:ln>
-            <a:noFill/>
-          </a:ln>
-        </p:spPr>
-        <p:style>
-          <a:lnRef idx="2">
-            <a:schemeClr val="accent1">
-              <a:shade val="50000"/>
-            </a:schemeClr>
-          </a:lnRef>
-          <a:fillRef idx="1">
-            <a:schemeClr val="accent1"/>
-          </a:fillRef>
-          <a:effectRef idx="0">
-            <a:schemeClr val="accent1"/>
-          </a:effectRef>
-          <a:fontRef idx="minor">
-            <a:schemeClr val="lt1"/>
-          </a:fontRef>
-        </p:style>
-        <p:txBody>
-          <a:bodyPr rtlCol="0" anchor="ctr"/>
-          <a:lstStyle/>
-          <a:p>
-            <a:pPr algn="ctr"/>
-            <a:endParaRPr lang="en-US"/>
-          </a:p>
-        </p:txBody>
-      </p:sp>
-      <p:sp>
-        <p:nvSpPr>
-          <p:cNvPr id="37" name="Rectangle 36">
-            <a:extLst>
-              <a:ext uri="{FF2B5EF4-FFF2-40B4-BE49-F238E27FC236}">
-                <a16:creationId xmlns:a16="http://schemas.microsoft.com/office/drawing/2014/main" id="{8B068B58-6F94-4AFF-A8A7-18573884D6CD}"/>
-              </a:ext>
-              <a:ext uri="{C183D7F6-B498-43B3-948B-1728B52AA6E4}">
-                <adec:decorative xmlns:adec="http://schemas.microsoft.com/office/drawing/2017/decorative" val="1"/>
-              </a:ext>
-            </a:extLst>
-          </p:cNvPr>
-          <p:cNvSpPr>
-            <a:spLocks noGrp="1" noRot="1" noChangeAspect="1" noMove="1" noResize="1" noEditPoints="1" noAdjustHandles="1" noChangeArrowheads="1" noChangeShapeType="1" noTextEdit="1"/>
-          </p:cNvSpPr>
-          <p:nvPr>
-            <p:extLst>
-              <p:ext uri="{386F3935-93C4-4BCD-93E2-E3B085C9AB24}">
-                <p16:designElem xmlns:p16="http://schemas.microsoft.com/office/powerpoint/2015/main" val="1"/>
-              </p:ext>
-            </p:extLst>
-          </p:nvPr>
-        </p:nvSpPr>
-        <p:spPr>
-          <a:xfrm>
-            <a:off x="0" y="0"/>
-            <a:ext cx="12188952" cy="6858000"/>
-          </a:xfrm>
-          <a:prstGeom prst="rect">
-            <a:avLst/>
-          </a:prstGeom>
-          <a:solidFill>
-            <a:schemeClr val="bg2">
-              <a:alpha val="50000"/>
-            </a:schemeClr>
-          </a:solidFill>
-          <a:ln>
-            <a:noFill/>
-          </a:ln>
-        </p:spPr>
-        <p:style>
-          <a:lnRef idx="2">
-            <a:schemeClr val="accent1">
-              <a:shade val="50000"/>
-            </a:schemeClr>
-          </a:lnRef>
-          <a:fillRef idx="1">
-            <a:schemeClr val="accent1"/>
-          </a:fillRef>
-          <a:effectRef idx="0">
-            <a:schemeClr val="accent1"/>
-          </a:effectRef>
-          <a:fontRef idx="minor">
-            <a:schemeClr val="lt1"/>
-          </a:fontRef>
-        </p:style>
-        <p:txBody>
-          <a:bodyPr rtlCol="0" anchor="ctr"/>
-          <a:lstStyle/>
-          <a:p>
-            <a:pPr algn="ctr"/>
-            <a:endParaRPr lang="en-US" dirty="0"/>
-          </a:p>
-        </p:txBody>
-      </p:sp>
-      <p:pic>
-        <p:nvPicPr>
-          <p:cNvPr id="39" name="Picture 38">
-            <a:extLst>
-              <a:ext uri="{FF2B5EF4-FFF2-40B4-BE49-F238E27FC236}">
-                <a16:creationId xmlns:a16="http://schemas.microsoft.com/office/drawing/2014/main" id="{B0DAC8FB-A162-44E3-A606-C855A03A5B09}"/>
-              </a:ext>
-              <a:ext uri="{C183D7F6-B498-43B3-948B-1728B52AA6E4}">
-                <adec:decorative xmlns:adec="http://schemas.microsoft.com/office/drawing/2017/decorative" val="1"/>
-              </a:ext>
-            </a:extLst>
-          </p:cNvPr>
-          <p:cNvPicPr>
-            <a:picLocks noGrp="1" noRot="1" noChangeAspect="1" noMove="1" noResize="1" noEditPoints="1" noAdjustHandles="1" noChangeArrowheads="1" noChangeShapeType="1" noCrop="1"/>
-          </p:cNvPicPr>
-          <p:nvPr>
-            <p:extLst>
-              <p:ext uri="{386F3935-93C4-4BCD-93E2-E3B085C9AB24}">
-                <p16:designElem xmlns:p16="http://schemas.microsoft.com/office/powerpoint/2015/main" val="1"/>
-              </p:ext>
-            </p:extLst>
-          </p:nvPr>
-        </p:nvPicPr>
-        <p:blipFill>
-          <a:blip r:embed="rId2">
-            <a:extLst>
-              <a:ext uri="{28A0092B-C50C-407E-A947-70E740481C1C}">
-                <a14:useLocalDpi xmlns:a14="http://schemas.microsoft.com/office/drawing/2010/main" val="0"/>
-              </a:ext>
-            </a:extLst>
-          </a:blip>
-          <a:stretch>
-            <a:fillRect/>
-          </a:stretch>
-        </p:blipFill>
-        <p:spPr>
-          <a:xfrm>
-            <a:off x="0" y="0"/>
-            <a:ext cx="12188952" cy="6862380"/>
-          </a:xfrm>
-          <a:prstGeom prst="rect">
-            <a:avLst/>
-          </a:prstGeom>
-        </p:spPr>
-      </p:pic>
-      <p:sp>
-        <p:nvSpPr>
-          <p:cNvPr id="41" name="Rectangle 40">
-            <a:extLst>
-              <a:ext uri="{FF2B5EF4-FFF2-40B4-BE49-F238E27FC236}">
-                <a16:creationId xmlns:a16="http://schemas.microsoft.com/office/drawing/2014/main" id="{21BDEC81-16A7-4451-B893-C15000083B77}"/>
-              </a:ext>
-              <a:ext uri="{C183D7F6-B498-43B3-948B-1728B52AA6E4}">
-                <adec:decorative xmlns:adec="http://schemas.microsoft.com/office/drawing/2017/decorative" val="1"/>
-              </a:ext>
-            </a:extLst>
-          </p:cNvPr>
-          <p:cNvSpPr>
-            <a:spLocks noGrp="1" noRot="1" noChangeAspect="1" noMove="1" noResize="1" noEditPoints="1" noAdjustHandles="1" noChangeArrowheads="1" noChangeShapeType="1" noTextEdit="1"/>
-          </p:cNvSpPr>
-          <p:nvPr>
-            <p:extLst>
-              <p:ext uri="{386F3935-93C4-4BCD-93E2-E3B085C9AB24}">
-                <p16:designElem xmlns:p16="http://schemas.microsoft.com/office/powerpoint/2015/main" val="1"/>
-              </p:ext>
-            </p:extLst>
-          </p:nvPr>
-        </p:nvSpPr>
-        <p:spPr>
-          <a:xfrm>
-            <a:off x="0" y="0"/>
-            <a:ext cx="12188952" cy="6858000"/>
-          </a:xfrm>
-          <a:prstGeom prst="rect">
-            <a:avLst/>
-          </a:prstGeom>
-          <a:solidFill>
-            <a:schemeClr val="accent1">
-              <a:alpha val="20000"/>
-            </a:schemeClr>
-          </a:solidFill>
-          <a:ln>
-            <a:noFill/>
-          </a:ln>
-        </p:spPr>
-        <p:style>
-          <a:lnRef idx="2">
-            <a:schemeClr val="accent1">
-              <a:shade val="50000"/>
-            </a:schemeClr>
-          </a:lnRef>
-          <a:fillRef idx="1">
-            <a:schemeClr val="accent1"/>
-          </a:fillRef>
-          <a:effectRef idx="0">
-            <a:schemeClr val="accent1"/>
-          </a:effectRef>
-          <a:fontRef idx="minor">
-            <a:schemeClr val="lt1"/>
-          </a:fontRef>
-        </p:style>
-        <p:txBody>
-          <a:bodyPr rtlCol="0" anchor="ctr"/>
-          <a:lstStyle/>
-          <a:p>
-            <a:pPr algn="ctr"/>
-            <a:endParaRPr lang="en-US" dirty="0"/>
-          </a:p>
-        </p:txBody>
-      </p:sp>
-      <p:sp>
-        <p:nvSpPr>
-          <p:cNvPr id="43" name="Rectangle 42">
-            <a:extLst>
-              <a:ext uri="{FF2B5EF4-FFF2-40B4-BE49-F238E27FC236}">
-                <a16:creationId xmlns:a16="http://schemas.microsoft.com/office/drawing/2014/main" id="{BE5B028C-7535-45E5-9D2C-32C50D0E0E43}"/>
-              </a:ext>
-              <a:ext uri="{C183D7F6-B498-43B3-948B-1728B52AA6E4}">
-                <adec:decorative xmlns:adec="http://schemas.microsoft.com/office/drawing/2017/decorative" val="1"/>
-              </a:ext>
-            </a:extLst>
-          </p:cNvPr>
-          <p:cNvSpPr>
-            <a:spLocks noGrp="1" noRot="1" noChangeAspect="1" noMove="1" noResize="1" noEditPoints="1" noAdjustHandles="1" noChangeArrowheads="1" noChangeShapeType="1" noTextEdit="1"/>
-          </p:cNvSpPr>
-          <p:nvPr>
-            <p:extLst>
-              <p:ext uri="{386F3935-93C4-4BCD-93E2-E3B085C9AB24}">
-                <p16:designElem xmlns:p16="http://schemas.microsoft.com/office/powerpoint/2015/main" val="1"/>
-              </p:ext>
-            </p:extLst>
-          </p:nvPr>
-        </p:nvSpPr>
-        <p:spPr>
-          <a:xfrm>
-            <a:off x="538542" y="729175"/>
-            <a:ext cx="11099352" cy="5399650"/>
-          </a:xfrm>
-          <a:prstGeom prst="rect">
-            <a:avLst/>
-          </a:prstGeom>
-          <a:solidFill>
-            <a:schemeClr val="bg1"/>
-          </a:solidFill>
-          <a:ln w="34925">
-            <a:noFill/>
-          </a:ln>
-        </p:spPr>
-        <p:style>
-          <a:lnRef idx="2">
-            <a:schemeClr val="accent1">
-              <a:shade val="50000"/>
-            </a:schemeClr>
-          </a:lnRef>
-          <a:fillRef idx="1">
-            <a:schemeClr val="accent1"/>
-          </a:fillRef>
-          <a:effectRef idx="0">
-            <a:schemeClr val="accent1"/>
-          </a:effectRef>
-          <a:fontRef idx="minor">
-            <a:schemeClr val="lt1"/>
-          </a:fontRef>
-        </p:style>
-        <p:txBody>
-          <a:bodyPr rtlCol="0" anchor="ctr"/>
-          <a:lstStyle/>
-          <a:p>
-            <a:pPr algn="ctr"/>
-            <a:endParaRPr lang="en-US" b="1">
-              <a:ln w="22225">
-                <a:solidFill>
-                  <a:schemeClr val="accent2"/>
-                </a:solidFill>
-                <a:prstDash val="solid"/>
-              </a:ln>
-              <a:solidFill>
-                <a:schemeClr val="accent2">
-                  <a:lumMod val="40000"/>
-                  <a:lumOff val="60000"/>
-                </a:schemeClr>
-              </a:solidFill>
-            </a:endParaRPr>
-          </a:p>
-        </p:txBody>
-      </p:sp>
-      <p:sp>
-        <p:nvSpPr>
-          <p:cNvPr id="4" name="Title 1">
-            <a:extLst>
-              <a:ext uri="{FF2B5EF4-FFF2-40B4-BE49-F238E27FC236}">
-                <a16:creationId xmlns:a16="http://schemas.microsoft.com/office/drawing/2014/main" id="{B933152F-209E-3E19-DBB9-EB3C01F6B4F7}"/>
-              </a:ext>
-            </a:extLst>
-          </p:cNvPr>
-          <p:cNvSpPr txBox="1">
-            <a:spLocks/>
-          </p:cNvSpPr>
-          <p:nvPr/>
-        </p:nvSpPr>
-        <p:spPr>
-          <a:xfrm>
-            <a:off x="1191966" y="900622"/>
-            <a:ext cx="9429142" cy="857840"/>
-          </a:xfrm>
-          <a:prstGeom prst="rect">
-            <a:avLst/>
-          </a:prstGeom>
-        </p:spPr>
-        <p:txBody>
-          <a:bodyPr vert="horz" lIns="91440" tIns="45720" rIns="91440" bIns="45720" rtlCol="0" anchor="b">
-            <a:normAutofit/>
-          </a:bodyPr>
-          <a:lstStyle>
-            <a:lvl1pPr algn="l" defTabSz="914400" rtl="0" eaLnBrk="1" latinLnBrk="0" hangingPunct="1">
-              <a:lnSpc>
-                <a:spcPct val="90000"/>
-              </a:lnSpc>
-              <a:spcBef>
-                <a:spcPct val="0"/>
-              </a:spcBef>
-              <a:buNone/>
-              <a:defRPr sz="4400" kern="1200">
-                <a:solidFill>
-                  <a:schemeClr val="tx1"/>
-                </a:solidFill>
-                <a:latin typeface="+mj-lt"/>
-                <a:ea typeface="+mj-ea"/>
-                <a:cs typeface="+mj-cs"/>
-              </a:defRPr>
-            </a:lvl1pPr>
-          </a:lstStyle>
-          <a:p>
-            <a:pPr>
-              <a:spcAft>
-                <a:spcPts val="600"/>
-              </a:spcAft>
-            </a:pPr>
-            <a:r>
-              <a:rPr lang="en-US" sz="2800" b="1" i="0" dirty="0">
-                <a:solidFill>
-                  <a:srgbClr val="1F2328"/>
-                </a:solidFill>
-                <a:effectLst/>
-                <a:latin typeface="+mn-lt"/>
-              </a:rPr>
-              <a:t>Recommendations: </a:t>
-            </a:r>
-            <a:r>
-              <a:rPr lang="en-US" sz="2800" b="1" i="0" dirty="0">
-                <a:solidFill>
-                  <a:srgbClr val="1F2328"/>
-                </a:solidFill>
-                <a:effectLst/>
-                <a:latin typeface="-apple-system"/>
-              </a:rPr>
-              <a:t>What Actions should the Bank Consider? </a:t>
-            </a:r>
-            <a:endParaRPr lang="en-US" sz="2800" b="1" i="0" dirty="0">
-              <a:effectLst/>
-              <a:latin typeface="+mn-lt"/>
-            </a:endParaRPr>
-          </a:p>
-        </p:txBody>
-      </p:sp>
-      <p:sp>
-        <p:nvSpPr>
-          <p:cNvPr id="3" name="Content Placeholder 2">
-            <a:extLst>
-              <a:ext uri="{FF2B5EF4-FFF2-40B4-BE49-F238E27FC236}">
-                <a16:creationId xmlns:a16="http://schemas.microsoft.com/office/drawing/2014/main" id="{7B8F423F-870B-E576-FF3E-DD2BC827E59E}"/>
-              </a:ext>
-            </a:extLst>
-          </p:cNvPr>
-          <p:cNvSpPr>
-            <a:spLocks noGrp="1"/>
-          </p:cNvSpPr>
-          <p:nvPr>
-            <p:ph idx="1"/>
-          </p:nvPr>
-        </p:nvSpPr>
-        <p:spPr>
-          <a:xfrm>
-            <a:off x="1191966" y="2029768"/>
-            <a:ext cx="9328658" cy="3877370"/>
-          </a:xfrm>
-        </p:spPr>
-        <p:txBody>
-          <a:bodyPr vert="horz" lIns="91440" tIns="45720" rIns="91440" bIns="45720" rtlCol="0">
-            <a:noAutofit/>
-          </a:bodyPr>
-          <a:lstStyle/>
-          <a:p>
-            <a:pPr marL="0" indent="0" algn="l">
-              <a:buNone/>
-            </a:pPr>
-            <a:r>
-              <a:rPr lang="en-US" sz="1500" b="1" i="0" dirty="0">
-                <a:solidFill>
-                  <a:srgbClr val="1F2328"/>
-                </a:solidFill>
-                <a:effectLst/>
-                <a:latin typeface="-apple-system"/>
-              </a:rPr>
-              <a:t>Solutions for the Next Marketing Campaign (Conclusion):</a:t>
-            </a:r>
-            <a:endParaRPr lang="en-US" sz="1500" dirty="0">
-              <a:solidFill>
-                <a:srgbClr val="1F2328"/>
-              </a:solidFill>
-              <a:latin typeface="-apple-system"/>
-            </a:endParaRPr>
-          </a:p>
-          <a:p>
-            <a:pPr algn="l">
-              <a:buFont typeface="+mj-lt"/>
-              <a:buAutoNum type="arabicPeriod"/>
-            </a:pPr>
-            <a:r>
-              <a:rPr lang="en-US" sz="1500" b="1" i="0" dirty="0">
-                <a:solidFill>
-                  <a:srgbClr val="1F2328"/>
-                </a:solidFill>
-                <a:effectLst/>
-                <a:latin typeface="-apple-system"/>
-              </a:rPr>
-              <a:t>Age Category:</a:t>
-            </a:r>
-            <a:r>
-              <a:rPr lang="en-US" sz="1500" b="0" i="0" dirty="0">
-                <a:solidFill>
-                  <a:srgbClr val="1F2328"/>
-                </a:solidFill>
-                <a:effectLst/>
-                <a:latin typeface="-apple-system"/>
-              </a:rPr>
-              <a:t> The next marketing campaign of the bank should target potential clients from age categories below 30 years old and above 50 years old.</a:t>
-            </a:r>
-          </a:p>
-          <a:p>
-            <a:pPr algn="l">
-              <a:buFont typeface="+mj-lt"/>
-              <a:buAutoNum type="arabicPeriod"/>
-            </a:pPr>
-            <a:r>
-              <a:rPr lang="en-US" sz="1500" b="1" i="0" dirty="0">
-                <a:solidFill>
-                  <a:srgbClr val="1F2328"/>
-                </a:solidFill>
-                <a:effectLst/>
-                <a:latin typeface="-apple-system"/>
-              </a:rPr>
-              <a:t>Occupation:</a:t>
-            </a:r>
-            <a:r>
-              <a:rPr lang="en-US" sz="1500" b="0" i="0" dirty="0">
-                <a:solidFill>
-                  <a:srgbClr val="1F2328"/>
-                </a:solidFill>
-                <a:effectLst/>
-                <a:latin typeface="-apple-system"/>
-              </a:rPr>
-              <a:t> Not surprisingly, potential clients that were students or retired were the most likely to subscribe to a term deposit. Retired individuals, tend to have more term deposits in order to gain some cash through interest payments. Remember, term deposits are short-term loans in which the individual (in this case the retired person) agrees not to withdraw the cash from the bank until a certain date agreed between the individual and the financial institution. After that time the individual gets its capital back and its interest made on the loan. Retired individuals tend to not spend bigly its cash so they are more likely to put their cash to work by lending it to the financial institution. Students were the other group that used to subscribe term deposits.</a:t>
-            </a:r>
-          </a:p>
-          <a:p>
-            <a:pPr algn="l">
-              <a:buFont typeface="+mj-lt"/>
-              <a:buAutoNum type="arabicPeriod"/>
-            </a:pPr>
-            <a:r>
-              <a:rPr lang="en-US" sz="1500" b="1" i="0" dirty="0">
-                <a:solidFill>
-                  <a:srgbClr val="1F2328"/>
-                </a:solidFill>
-                <a:effectLst/>
-                <a:latin typeface="-apple-system"/>
-              </a:rPr>
-              <a:t>Balance:</a:t>
-            </a:r>
-            <a:r>
-              <a:rPr lang="en-US" sz="1500" b="0" i="0" dirty="0">
-                <a:solidFill>
-                  <a:srgbClr val="1F2328"/>
-                </a:solidFill>
-                <a:effectLst/>
-                <a:latin typeface="-apple-system"/>
-              </a:rPr>
-              <a:t> The customer's account balance has a huge influence on the campaign's outcome. People with account balance above 1490$ are more likely to subscribe for term deposit, so future address those customers.</a:t>
-            </a:r>
-          </a:p>
-          <a:p>
-            <a:pPr algn="l">
-              <a:buFont typeface="+mj-lt"/>
-              <a:buAutoNum type="arabicPeriod"/>
-            </a:pPr>
-            <a:r>
-              <a:rPr lang="en-US" sz="1500" b="1" i="0" dirty="0">
-                <a:solidFill>
-                  <a:srgbClr val="1F2328"/>
-                </a:solidFill>
-                <a:effectLst/>
-                <a:latin typeface="-apple-system"/>
-              </a:rPr>
-              <a:t>Seasonality:</a:t>
-            </a:r>
-            <a:r>
-              <a:rPr lang="en-US" sz="1500" b="0" i="0" dirty="0">
-                <a:solidFill>
-                  <a:srgbClr val="1F2328"/>
-                </a:solidFill>
-                <a:effectLst/>
-                <a:latin typeface="-apple-system"/>
-              </a:rPr>
-              <a:t> Potential clients opted to subscribe term deposits during the seasons of fall and winter. The next marketing campaign should focus its activity throughout these seasons.</a:t>
-            </a:r>
-          </a:p>
-          <a:p>
-            <a:pPr algn="l">
-              <a:buFont typeface="+mj-lt"/>
-              <a:buAutoNum type="arabicPeriod"/>
-            </a:pPr>
-            <a:endParaRPr lang="en-US" sz="1500" dirty="0">
-              <a:solidFill>
-                <a:srgbClr val="1F2328"/>
-              </a:solidFill>
-            </a:endParaRPr>
-          </a:p>
-        </p:txBody>
-      </p:sp>
-    </p:spTree>
-    <p:extLst>
-      <p:ext uri="{BB962C8B-B14F-4D97-AF65-F5344CB8AC3E}">
-        <p14:creationId xmlns:p14="http://schemas.microsoft.com/office/powerpoint/2010/main" val="3225170695"/>
-      </p:ext>
-    </p:extLst>
-  </p:cSld>
-  <p:clrMapOvr>
-    <a:masterClrMapping/>
-  </p:clrMapOvr>
-</p:sld>
-</file>
-
-<file path=ppt/slides/slide21.xml><?xml version="1.0" encoding="utf-8"?>
 <p:sld xmlns:a="http://schemas.openxmlformats.org/drawingml/2006/main" xmlns:r="http://schemas.openxmlformats.org/officeDocument/2006/relationships" xmlns:p="http://schemas.openxmlformats.org/presentationml/2006/main">
   <p:cSld>
     <p:bg>

</xml_diff>